<commit_message>
added heroku mention in the slides
</commit_message>
<xml_diff>
--- a/Project 3.pptx
+++ b/Project 3.pptx
@@ -245,7 +245,7 @@
           <a:p>
             <a:fld id="{12E52447-60D6-491E-BFAB-FA8E8653151C}" type="datetimeFigureOut">
               <a:rPr lang="en-US" smtClean="0"/>
-              <a:t>4/6/2020</a:t>
+              <a:t>4/8/2020</a:t>
             </a:fld>
             <a:endParaRPr lang="en-US"/>
           </a:p>
@@ -413,7 +413,7 @@
           <a:p>
             <a:fld id="{12E52447-60D6-491E-BFAB-FA8E8653151C}" type="datetimeFigureOut">
               <a:rPr lang="en-US" smtClean="0"/>
-              <a:t>4/6/2020</a:t>
+              <a:t>4/8/2020</a:t>
             </a:fld>
             <a:endParaRPr lang="en-US"/>
           </a:p>
@@ -591,7 +591,7 @@
           <a:p>
             <a:fld id="{12E52447-60D6-491E-BFAB-FA8E8653151C}" type="datetimeFigureOut">
               <a:rPr lang="en-US" smtClean="0"/>
-              <a:t>4/6/2020</a:t>
+              <a:t>4/8/2020</a:t>
             </a:fld>
             <a:endParaRPr lang="en-US"/>
           </a:p>
@@ -759,7 +759,7 @@
           <a:p>
             <a:fld id="{12E52447-60D6-491E-BFAB-FA8E8653151C}" type="datetimeFigureOut">
               <a:rPr lang="en-US" smtClean="0"/>
-              <a:t>4/6/2020</a:t>
+              <a:t>4/8/2020</a:t>
             </a:fld>
             <a:endParaRPr lang="en-US"/>
           </a:p>
@@ -1004,7 +1004,7 @@
           <a:p>
             <a:fld id="{12E52447-60D6-491E-BFAB-FA8E8653151C}" type="datetimeFigureOut">
               <a:rPr lang="en-US" smtClean="0"/>
-              <a:t>4/6/2020</a:t>
+              <a:t>4/8/2020</a:t>
             </a:fld>
             <a:endParaRPr lang="en-US"/>
           </a:p>
@@ -1233,7 +1233,7 @@
           <a:p>
             <a:fld id="{12E52447-60D6-491E-BFAB-FA8E8653151C}" type="datetimeFigureOut">
               <a:rPr lang="en-US" smtClean="0"/>
-              <a:t>4/6/2020</a:t>
+              <a:t>4/8/2020</a:t>
             </a:fld>
             <a:endParaRPr lang="en-US"/>
           </a:p>
@@ -1597,7 +1597,7 @@
           <a:p>
             <a:fld id="{12E52447-60D6-491E-BFAB-FA8E8653151C}" type="datetimeFigureOut">
               <a:rPr lang="en-US" smtClean="0"/>
-              <a:t>4/6/2020</a:t>
+              <a:t>4/8/2020</a:t>
             </a:fld>
             <a:endParaRPr lang="en-US"/>
           </a:p>
@@ -1714,7 +1714,7 @@
           <a:p>
             <a:fld id="{12E52447-60D6-491E-BFAB-FA8E8653151C}" type="datetimeFigureOut">
               <a:rPr lang="en-US" smtClean="0"/>
-              <a:t>4/6/2020</a:t>
+              <a:t>4/8/2020</a:t>
             </a:fld>
             <a:endParaRPr lang="en-US"/>
           </a:p>
@@ -1809,7 +1809,7 @@
           <a:p>
             <a:fld id="{12E52447-60D6-491E-BFAB-FA8E8653151C}" type="datetimeFigureOut">
               <a:rPr lang="en-US" smtClean="0"/>
-              <a:t>4/6/2020</a:t>
+              <a:t>4/8/2020</a:t>
             </a:fld>
             <a:endParaRPr lang="en-US"/>
           </a:p>
@@ -2084,7 +2084,7 @@
           <a:p>
             <a:fld id="{12E52447-60D6-491E-BFAB-FA8E8653151C}" type="datetimeFigureOut">
               <a:rPr lang="en-US" smtClean="0"/>
-              <a:t>4/6/2020</a:t>
+              <a:t>4/8/2020</a:t>
             </a:fld>
             <a:endParaRPr lang="en-US"/>
           </a:p>
@@ -2336,7 +2336,7 @@
           <a:p>
             <a:fld id="{12E52447-60D6-491E-BFAB-FA8E8653151C}" type="datetimeFigureOut">
               <a:rPr lang="en-US" smtClean="0"/>
-              <a:t>4/6/2020</a:t>
+              <a:t>4/8/2020</a:t>
             </a:fld>
             <a:endParaRPr lang="en-US"/>
           </a:p>
@@ -2559,7 +2559,7 @@
           <a:p>
             <a:fld id="{12E52447-60D6-491E-BFAB-FA8E8653151C}" type="datetimeFigureOut">
               <a:rPr lang="en-US" smtClean="0"/>
-              <a:t>4/6/2020</a:t>
+              <a:t>4/8/2020</a:t>
             </a:fld>
             <a:endParaRPr lang="en-US"/>
           </a:p>
@@ -3401,13 +3401,36 @@
           </a:p>
           <a:p>
             <a:r>
-              <a:rPr lang="en-US" dirty="0">
+              <a:rPr lang="en-US" dirty="0" smtClean="0">
                 <a:solidFill>
                   <a:schemeClr val="bg1"/>
                 </a:solidFill>
               </a:rPr>
               <a:t>HTML/CSS/Bootstrap</a:t>
             </a:r>
+          </a:p>
+          <a:p>
+            <a:r>
+              <a:rPr lang="en-US" dirty="0" err="1">
+                <a:solidFill>
+                  <a:schemeClr val="bg1"/>
+                </a:solidFill>
+              </a:rPr>
+              <a:t>H</a:t>
+            </a:r>
+            <a:r>
+              <a:rPr lang="en-US" dirty="0" err="1" smtClean="0">
+                <a:solidFill>
+                  <a:schemeClr val="bg1"/>
+                </a:solidFill>
+              </a:rPr>
+              <a:t>eroku</a:t>
+            </a:r>
+            <a:endParaRPr lang="en-US" dirty="0">
+              <a:solidFill>
+                <a:schemeClr val="bg1"/>
+              </a:solidFill>
+            </a:endParaRPr>
           </a:p>
         </p:txBody>
       </p:sp>
@@ -3723,15 +3746,7 @@
                   <a:schemeClr val="bg1"/>
                 </a:solidFill>
               </a:rPr>
-              <a:t>Actual and predicted data showed that students can be heavy drinkers on both the weekend and weekdays and still pass with a “C”. However, if their goal is an “A” then they will need to reduce to a low level of </a:t>
-            </a:r>
-            <a:r>
-              <a:rPr lang="en-US">
-                <a:solidFill>
-                  <a:schemeClr val="bg1"/>
-                </a:solidFill>
-              </a:rPr>
-              <a:t>drinking.</a:t>
+              <a:t>Actual and predicted data showed that students can be heavy drinkers on both the weekend and weekdays and still pass with a “C”. However, if their goal is an “A” then they will need to reduce to a low level of drinking.</a:t>
             </a:r>
           </a:p>
           <a:p>
@@ -3748,8 +3763,29 @@
                   <a:schemeClr val="bg1"/>
                 </a:solidFill>
               </a:rPr>
-              <a:t>Let’s go explore the Data…</a:t>
-            </a:r>
+              <a:t>Let’s go explore the Data</a:t>
+            </a:r>
+            <a:r>
+              <a:rPr lang="en-US" dirty="0" smtClean="0">
+                <a:solidFill>
+                  <a:schemeClr val="bg1"/>
+                </a:solidFill>
+              </a:rPr>
+              <a:t>…</a:t>
+            </a:r>
+          </a:p>
+          <a:p>
+            <a:r>
+              <a:rPr lang="en-US" dirty="0">
+                <a:hlinkClick r:id="rId2"/>
+              </a:rPr>
+              <a:t>https://data-bootcamp-project-3.herokuapp.com/home.html</a:t>
+            </a:r>
+            <a:endParaRPr lang="en-US" dirty="0">
+              <a:solidFill>
+                <a:schemeClr val="bg1"/>
+              </a:solidFill>
+            </a:endParaRPr>
           </a:p>
         </p:txBody>
       </p:sp>

</xml_diff>